<commit_message>
updates slides an alternative solution
</commit_message>
<xml_diff>
--- a/project-dataviz.pptx
+++ b/project-dataviz.pptx
@@ -7,10 +7,11 @@
   <p:sldIdLst>
     <p:sldId id="256" r:id="rId2"/>
     <p:sldId id="258" r:id="rId3"/>
-    <p:sldId id="257" r:id="rId4"/>
-    <p:sldId id="259" r:id="rId5"/>
+    <p:sldId id="259" r:id="rId4"/>
+    <p:sldId id="257" r:id="rId5"/>
     <p:sldId id="260" r:id="rId6"/>
     <p:sldId id="261" r:id="rId7"/>
+    <p:sldId id="262" r:id="rId8"/>
   </p:sldIdLst>
   <p:sldSz cx="12192000" cy="6858000"/>
   <p:notesSz cx="6858000" cy="9144000"/>
@@ -20786,7 +20787,105 @@
                 <a:effectLst/>
                 <a:latin typeface="Arial" panose="020B0604020202020204" pitchFamily="34" charset="0"/>
               </a:rPr>
-              <a:t> selecting the Pope. The original idea was for the most knowledgeable and informed individuals from each State to select the president based solely on merit and without regard to State of origin or political party.”</a:t>
+              <a:t> selecting the Pope. The original idea was for the most </a:t>
+            </a:r>
+            <a:r>
+              <a:rPr lang="en-US" b="1" i="0" dirty="0">
+                <a:effectLst/>
+                <a:latin typeface="Arial" panose="020B0604020202020204" pitchFamily="34" charset="0"/>
+              </a:rPr>
+              <a:t>knowledgeable</a:t>
+            </a:r>
+            <a:r>
+              <a:rPr lang="en-US" b="0" i="0" dirty="0">
+                <a:effectLst/>
+                <a:latin typeface="Arial" panose="020B0604020202020204" pitchFamily="34" charset="0"/>
+              </a:rPr>
+              <a:t> and </a:t>
+            </a:r>
+            <a:r>
+              <a:rPr lang="en-US" b="1" i="0" dirty="0">
+                <a:effectLst/>
+                <a:latin typeface="Arial" panose="020B0604020202020204" pitchFamily="34" charset="0"/>
+              </a:rPr>
+              <a:t>informed individuals </a:t>
+            </a:r>
+            <a:r>
+              <a:rPr lang="en-US" b="0" i="0" dirty="0">
+                <a:effectLst/>
+                <a:latin typeface="Arial" panose="020B0604020202020204" pitchFamily="34" charset="0"/>
+              </a:rPr>
+              <a:t>from each State to </a:t>
+            </a:r>
+            <a:r>
+              <a:rPr lang="en-US" b="1" i="0" dirty="0">
+                <a:effectLst/>
+                <a:latin typeface="Arial" panose="020B0604020202020204" pitchFamily="34" charset="0"/>
+              </a:rPr>
+              <a:t>select the president based </a:t>
+            </a:r>
+            <a:r>
+              <a:rPr lang="en-US" b="0" i="0" dirty="0">
+                <a:effectLst/>
+                <a:latin typeface="Arial" panose="020B0604020202020204" pitchFamily="34" charset="0"/>
+              </a:rPr>
+              <a:t>solely </a:t>
+            </a:r>
+            <a:r>
+              <a:rPr lang="en-US" b="1" i="0" dirty="0">
+                <a:effectLst/>
+                <a:latin typeface="Arial" panose="020B0604020202020204" pitchFamily="34" charset="0"/>
+              </a:rPr>
+              <a:t>on merit</a:t>
+            </a:r>
+            <a:r>
+              <a:rPr lang="en-US" b="0" i="0" dirty="0">
+                <a:effectLst/>
+                <a:latin typeface="Arial" panose="020B0604020202020204" pitchFamily="34" charset="0"/>
+              </a:rPr>
+              <a:t> and </a:t>
+            </a:r>
+            <a:r>
+              <a:rPr lang="en-US" b="1" i="0" dirty="0">
+                <a:effectLst/>
+                <a:latin typeface="Arial" panose="020B0604020202020204" pitchFamily="34" charset="0"/>
+              </a:rPr>
+              <a:t>without regard </a:t>
+            </a:r>
+            <a:r>
+              <a:rPr lang="en-US" b="0" i="0" dirty="0">
+                <a:effectLst/>
+                <a:latin typeface="Arial" panose="020B0604020202020204" pitchFamily="34" charset="0"/>
+              </a:rPr>
+              <a:t>to </a:t>
+            </a:r>
+            <a:r>
+              <a:rPr lang="en-US" b="1" i="0" dirty="0">
+                <a:effectLst/>
+                <a:latin typeface="Arial" panose="020B0604020202020204" pitchFamily="34" charset="0"/>
+              </a:rPr>
+              <a:t>State of origin</a:t>
+            </a:r>
+            <a:r>
+              <a:rPr lang="en-US" b="0" i="0" dirty="0">
+                <a:effectLst/>
+                <a:latin typeface="Arial" panose="020B0604020202020204" pitchFamily="34" charset="0"/>
+              </a:rPr>
+              <a:t> or </a:t>
+            </a:r>
+            <a:r>
+              <a:rPr lang="en-US" b="1" i="0" dirty="0">
+                <a:effectLst/>
+                <a:latin typeface="Arial" panose="020B0604020202020204" pitchFamily="34" charset="0"/>
+              </a:rPr>
+              <a:t>political party</a:t>
+            </a:r>
+            <a:r>
+              <a:rPr lang="en-US" b="0" i="0" dirty="0">
+                <a:effectLst/>
+                <a:latin typeface="Arial" panose="020B0604020202020204" pitchFamily="34" charset="0"/>
+              </a:rPr>
+              <a:t>.”</a:t>
             </a:r>
           </a:p>
           <a:p>
@@ -20821,536 +20920,6 @@
 </file>
 
 <file path=ppt/slides/slide3.xml><?xml version="1.0" encoding="utf-8"?>
-<p:sld xmlns:a="http://schemas.openxmlformats.org/drawingml/2006/main" xmlns:r="http://schemas.openxmlformats.org/officeDocument/2006/relationships" xmlns:p="http://schemas.openxmlformats.org/presentationml/2006/main">
-  <p:cSld>
-    <p:spTree>
-      <p:nvGrpSpPr>
-        <p:cNvPr id="1" name=""/>
-        <p:cNvGrpSpPr/>
-        <p:nvPr/>
-      </p:nvGrpSpPr>
-      <p:grpSpPr>
-        <a:xfrm>
-          <a:off x="0" y="0"/>
-          <a:ext cx="0" cy="0"/>
-          <a:chOff x="0" y="0"/>
-          <a:chExt cx="0" cy="0"/>
-        </a:xfrm>
-      </p:grpSpPr>
-      <p:pic>
-        <p:nvPicPr>
-          <p:cNvPr id="9" name="Content Placeholder 8">
-            <a:extLst>
-              <a:ext uri="{FF2B5EF4-FFF2-40B4-BE49-F238E27FC236}">
-                <a16:creationId xmlns:a16="http://schemas.microsoft.com/office/drawing/2014/main" id="{FA558190-E923-40AD-B51C-321D19F64C3B}"/>
-              </a:ext>
-            </a:extLst>
-          </p:cNvPr>
-          <p:cNvPicPr>
-            <a:picLocks noGrp="1" noChangeAspect="1"/>
-          </p:cNvPicPr>
-          <p:nvPr>
-            <p:ph idx="1"/>
-          </p:nvPr>
-        </p:nvPicPr>
-        <p:blipFill rotWithShape="1">
-          <a:blip r:embed="rId2">
-            <a:extLst>
-              <a:ext uri="{28A0092B-C50C-407E-A947-70E740481C1C}">
-                <a14:useLocalDpi xmlns:a14="http://schemas.microsoft.com/office/drawing/2010/main" val="0"/>
-              </a:ext>
-            </a:extLst>
-          </a:blip>
-          <a:srcRect t="8579" r="8614" b="6152"/>
-          <a:stretch/>
-        </p:blipFill>
-        <p:spPr>
-          <a:xfrm>
-            <a:off x="347257" y="1251031"/>
-            <a:ext cx="8308768" cy="5398049"/>
-          </a:xfrm>
-        </p:spPr>
-      </p:pic>
-      <p:sp>
-        <p:nvSpPr>
-          <p:cNvPr id="2" name="Title 1">
-            <a:extLst>
-              <a:ext uri="{FF2B5EF4-FFF2-40B4-BE49-F238E27FC236}">
-                <a16:creationId xmlns:a16="http://schemas.microsoft.com/office/drawing/2014/main" id="{FE56424F-548B-4D30-A99A-680338B5696C}"/>
-              </a:ext>
-            </a:extLst>
-          </p:cNvPr>
-          <p:cNvSpPr>
-            <a:spLocks noGrp="1"/>
-          </p:cNvSpPr>
-          <p:nvPr>
-            <p:ph type="title"/>
-          </p:nvPr>
-        </p:nvSpPr>
-        <p:spPr>
-          <a:xfrm>
-            <a:off x="684004" y="113991"/>
-            <a:ext cx="9720072" cy="1499616"/>
-          </a:xfrm>
-        </p:spPr>
-        <p:txBody>
-          <a:bodyPr/>
-          <a:lstStyle/>
-          <a:p>
-            <a:r>
-              <a:rPr lang="en-US" dirty="0"/>
-              <a:t>Electoral vote value (Traditional)</a:t>
-            </a:r>
-          </a:p>
-        </p:txBody>
-      </p:sp>
-      <p:sp>
-        <p:nvSpPr>
-          <p:cNvPr id="15" name="TextBox 14">
-            <a:extLst>
-              <a:ext uri="{FF2B5EF4-FFF2-40B4-BE49-F238E27FC236}">
-                <a16:creationId xmlns:a16="http://schemas.microsoft.com/office/drawing/2014/main" id="{DCB5FD58-FCAD-44CD-AEAC-A5563872A48E}"/>
-              </a:ext>
-            </a:extLst>
-          </p:cNvPr>
-          <p:cNvSpPr txBox="1"/>
-          <p:nvPr/>
-        </p:nvSpPr>
-        <p:spPr>
-          <a:xfrm>
-            <a:off x="8715884" y="2513086"/>
-            <a:ext cx="649609" cy="635841"/>
-          </a:xfrm>
-          <a:prstGeom prst="rect">
-            <a:avLst/>
-          </a:prstGeom>
-          <a:noFill/>
-        </p:spPr>
-        <p:txBody>
-          <a:bodyPr wrap="square" rtlCol="0">
-            <a:spAutoFit/>
-          </a:bodyPr>
-          <a:lstStyle/>
-          <a:p>
-            <a:endParaRPr lang="en-US" dirty="0"/>
-          </a:p>
-        </p:txBody>
-      </p:sp>
-      <p:grpSp>
-        <p:nvGrpSpPr>
-          <p:cNvPr id="25" name="Group 24">
-            <a:extLst>
-              <a:ext uri="{FF2B5EF4-FFF2-40B4-BE49-F238E27FC236}">
-                <a16:creationId xmlns:a16="http://schemas.microsoft.com/office/drawing/2014/main" id="{32A4E1F7-5B20-4404-9982-E00091173886}"/>
-              </a:ext>
-            </a:extLst>
-          </p:cNvPr>
-          <p:cNvGrpSpPr/>
-          <p:nvPr/>
-        </p:nvGrpSpPr>
-        <p:grpSpPr>
-          <a:xfrm>
-            <a:off x="8622649" y="1659242"/>
-            <a:ext cx="911877" cy="3064149"/>
-            <a:chOff x="9971221" y="1659242"/>
-            <a:chExt cx="911877" cy="3064149"/>
-          </a:xfrm>
-        </p:grpSpPr>
-        <p:cxnSp>
-          <p:nvCxnSpPr>
-            <p:cNvPr id="11" name="Straight Arrow Connector 10">
-              <a:extLst>
-                <a:ext uri="{FF2B5EF4-FFF2-40B4-BE49-F238E27FC236}">
-                  <a16:creationId xmlns:a16="http://schemas.microsoft.com/office/drawing/2014/main" id="{C1FF0EEA-9591-4CC2-9183-1FD27B4DA787}"/>
-                </a:ext>
-              </a:extLst>
-            </p:cNvPr>
-            <p:cNvCxnSpPr>
-              <a:cxnSpLocks/>
-            </p:cNvCxnSpPr>
-            <p:nvPr/>
-          </p:nvCxnSpPr>
-          <p:spPr>
-            <a:xfrm>
-              <a:off x="10017838" y="1659242"/>
-              <a:ext cx="0" cy="3064149"/>
-            </a:xfrm>
-            <a:prstGeom prst="straightConnector1">
-              <a:avLst/>
-            </a:prstGeom>
-            <a:ln>
-              <a:headEnd type="triangle"/>
-              <a:tailEnd type="triangle"/>
-            </a:ln>
-          </p:spPr>
-          <p:style>
-            <a:lnRef idx="1">
-              <a:schemeClr val="dk1"/>
-            </a:lnRef>
-            <a:fillRef idx="0">
-              <a:schemeClr val="dk1"/>
-            </a:fillRef>
-            <a:effectRef idx="0">
-              <a:schemeClr val="dk1"/>
-            </a:effectRef>
-            <a:fontRef idx="minor">
-              <a:schemeClr val="tx1"/>
-            </a:fontRef>
-          </p:style>
-        </p:cxnSp>
-        <p:sp>
-          <p:nvSpPr>
-            <p:cNvPr id="18" name="TextBox 17">
-              <a:extLst>
-                <a:ext uri="{FF2B5EF4-FFF2-40B4-BE49-F238E27FC236}">
-                  <a16:creationId xmlns:a16="http://schemas.microsoft.com/office/drawing/2014/main" id="{307C8936-8F91-48A5-9491-03BB285531CF}"/>
-                </a:ext>
-              </a:extLst>
-            </p:cNvPr>
-            <p:cNvSpPr txBox="1"/>
-            <p:nvPr/>
-          </p:nvSpPr>
-          <p:spPr>
-            <a:xfrm>
-              <a:off x="9971221" y="2891593"/>
-              <a:ext cx="911877" cy="369332"/>
-            </a:xfrm>
-            <a:prstGeom prst="rect">
-              <a:avLst/>
-            </a:prstGeom>
-            <a:noFill/>
-          </p:spPr>
-          <p:txBody>
-            <a:bodyPr wrap="square">
-              <a:spAutoFit/>
-            </a:bodyPr>
-            <a:lstStyle/>
-            <a:p>
-              <a:r>
-                <a:rPr lang="en-US" dirty="0"/>
-                <a:t>527k</a:t>
-              </a:r>
-            </a:p>
-          </p:txBody>
-        </p:sp>
-      </p:grpSp>
-      <p:grpSp>
-        <p:nvGrpSpPr>
-          <p:cNvPr id="24" name="Group 23">
-            <a:extLst>
-              <a:ext uri="{FF2B5EF4-FFF2-40B4-BE49-F238E27FC236}">
-                <a16:creationId xmlns:a16="http://schemas.microsoft.com/office/drawing/2014/main" id="{429CEC37-E2F0-4E45-BBEE-35DD9F8F1B7A}"/>
-              </a:ext>
-            </a:extLst>
-          </p:cNvPr>
-          <p:cNvGrpSpPr/>
-          <p:nvPr/>
-        </p:nvGrpSpPr>
-        <p:grpSpPr>
-          <a:xfrm>
-            <a:off x="851134" y="5571194"/>
-            <a:ext cx="597994" cy="369332"/>
-            <a:chOff x="2199706" y="5571194"/>
-            <a:chExt cx="597994" cy="369332"/>
-          </a:xfrm>
-        </p:grpSpPr>
-        <p:sp>
-          <p:nvSpPr>
-            <p:cNvPr id="17" name="TextBox 16">
-              <a:extLst>
-                <a:ext uri="{FF2B5EF4-FFF2-40B4-BE49-F238E27FC236}">
-                  <a16:creationId xmlns:a16="http://schemas.microsoft.com/office/drawing/2014/main" id="{8046B293-4B16-4C1E-BBCC-D428D75E0212}"/>
-                </a:ext>
-              </a:extLst>
-            </p:cNvPr>
-            <p:cNvSpPr txBox="1"/>
-            <p:nvPr/>
-          </p:nvSpPr>
-          <p:spPr>
-            <a:xfrm>
-              <a:off x="2199706" y="5571194"/>
-              <a:ext cx="597994" cy="369332"/>
-            </a:xfrm>
-            <a:prstGeom prst="rect">
-              <a:avLst/>
-            </a:prstGeom>
-            <a:noFill/>
-          </p:spPr>
-          <p:txBody>
-            <a:bodyPr wrap="square">
-              <a:spAutoFit/>
-            </a:bodyPr>
-            <a:lstStyle/>
-            <a:p>
-              <a:r>
-                <a:rPr lang="en-US" dirty="0"/>
-                <a:t>27k</a:t>
-              </a:r>
-            </a:p>
-          </p:txBody>
-        </p:sp>
-        <p:cxnSp>
-          <p:nvCxnSpPr>
-            <p:cNvPr id="21" name="Straight Arrow Connector 20">
-              <a:extLst>
-                <a:ext uri="{FF2B5EF4-FFF2-40B4-BE49-F238E27FC236}">
-                  <a16:creationId xmlns:a16="http://schemas.microsoft.com/office/drawing/2014/main" id="{7F204158-C8BA-440E-B573-E59A64921B76}"/>
-                </a:ext>
-              </a:extLst>
-            </p:cNvPr>
-            <p:cNvCxnSpPr>
-              <a:cxnSpLocks/>
-            </p:cNvCxnSpPr>
-            <p:nvPr/>
-          </p:nvCxnSpPr>
-          <p:spPr>
-            <a:xfrm>
-              <a:off x="2691536" y="5619624"/>
-              <a:ext cx="0" cy="272472"/>
-            </a:xfrm>
-            <a:prstGeom prst="straightConnector1">
-              <a:avLst/>
-            </a:prstGeom>
-            <a:ln>
-              <a:headEnd type="triangle"/>
-              <a:tailEnd type="triangle"/>
-            </a:ln>
-          </p:spPr>
-          <p:style>
-            <a:lnRef idx="1">
-              <a:schemeClr val="dk1"/>
-            </a:lnRef>
-            <a:fillRef idx="0">
-              <a:schemeClr val="dk1"/>
-            </a:fillRef>
-            <a:effectRef idx="0">
-              <a:schemeClr val="dk1"/>
-            </a:effectRef>
-            <a:fontRef idx="minor">
-              <a:schemeClr val="tx1"/>
-            </a:fontRef>
-          </p:style>
-        </p:cxnSp>
-      </p:grpSp>
-      <p:sp>
-        <p:nvSpPr>
-          <p:cNvPr id="26" name="TextBox 25">
-            <a:extLst>
-              <a:ext uri="{FF2B5EF4-FFF2-40B4-BE49-F238E27FC236}">
-                <a16:creationId xmlns:a16="http://schemas.microsoft.com/office/drawing/2014/main" id="{DD04B47C-7C1E-4211-9352-076DDD070D2F}"/>
-              </a:ext>
-            </a:extLst>
-          </p:cNvPr>
-          <p:cNvSpPr txBox="1"/>
-          <p:nvPr/>
-        </p:nvSpPr>
-        <p:spPr>
-          <a:xfrm flipH="1">
-            <a:off x="9078587" y="1659242"/>
-            <a:ext cx="2960273" cy="2616101"/>
-          </a:xfrm>
-          <a:prstGeom prst="rect">
-            <a:avLst/>
-          </a:prstGeom>
-          <a:noFill/>
-        </p:spPr>
-        <p:txBody>
-          <a:bodyPr wrap="square" rtlCol="0">
-            <a:spAutoFit/>
-          </a:bodyPr>
-          <a:lstStyle/>
-          <a:p>
-            <a:r>
-              <a:rPr lang="en-US" sz="2000" b="1" dirty="0"/>
-              <a:t>Current Electoral College</a:t>
-            </a:r>
-          </a:p>
-          <a:p>
-            <a:pPr marL="285750" indent="-285750">
-              <a:buFont typeface="Arial" panose="020B0604020202020204" pitchFamily="34" charset="0"/>
-              <a:buChar char="•"/>
-            </a:pPr>
-            <a:r>
-              <a:rPr lang="en-US" dirty="0"/>
-              <a:t>Electors  decided based on number of senators (2) </a:t>
-            </a:r>
-          </a:p>
-          <a:p>
-            <a:pPr marL="285750" indent="-285750">
-              <a:buFont typeface="Arial" panose="020B0604020202020204" pitchFamily="34" charset="0"/>
-              <a:buChar char="•"/>
-            </a:pPr>
-            <a:r>
-              <a:rPr lang="en-US" dirty="0"/>
-              <a:t>Number of representatives: based on relative population</a:t>
-            </a:r>
-            <a:r>
-              <a:rPr lang="en-US" b="0" i="0" dirty="0">
-                <a:solidFill>
-                  <a:srgbClr val="000000"/>
-                </a:solidFill>
-                <a:effectLst/>
-                <a:latin typeface="Lora"/>
-              </a:rPr>
-              <a:t> (minimum of 1) currently </a:t>
-            </a:r>
-            <a:r>
-              <a:rPr lang="en-US" b="1" i="0" dirty="0">
-                <a:solidFill>
-                  <a:srgbClr val="000000"/>
-                </a:solidFill>
-                <a:effectLst/>
-                <a:latin typeface="Lora"/>
-              </a:rPr>
-              <a:t>capped at 535</a:t>
-            </a:r>
-          </a:p>
-          <a:p>
-            <a:pPr marL="285750" indent="-285750">
-              <a:buFont typeface="Arial" panose="020B0604020202020204" pitchFamily="34" charset="0"/>
-              <a:buChar char="•"/>
-            </a:pPr>
-            <a:r>
-              <a:rPr lang="en-US" dirty="0"/>
-              <a:t>Each state has a minimum of 3 electors</a:t>
-            </a:r>
-          </a:p>
-        </p:txBody>
-      </p:sp>
-    </p:spTree>
-    <p:extLst>
-      <p:ext uri="{BB962C8B-B14F-4D97-AF65-F5344CB8AC3E}">
-        <p14:creationId xmlns:p14="http://schemas.microsoft.com/office/powerpoint/2010/main" val="2235912950"/>
-      </p:ext>
-    </p:extLst>
-  </p:cSld>
-  <p:clrMapOvr>
-    <a:masterClrMapping/>
-  </p:clrMapOvr>
-  <p:timing>
-    <p:tnLst>
-      <p:par>
-        <p:cTn id="1" dur="indefinite" restart="never" nodeType="tmRoot">
-          <p:childTnLst>
-            <p:seq concurrent="1" nextAc="seek">
-              <p:cTn id="2" dur="indefinite" nodeType="mainSeq">
-                <p:childTnLst>
-                  <p:par>
-                    <p:cTn id="3" fill="hold">
-                      <p:stCondLst>
-                        <p:cond delay="indefinite"/>
-                      </p:stCondLst>
-                      <p:childTnLst>
-                        <p:par>
-                          <p:cTn id="4" fill="hold">
-                            <p:stCondLst>
-                              <p:cond delay="0"/>
-                            </p:stCondLst>
-                            <p:childTnLst>
-                              <p:par>
-                                <p:cTn id="5" presetID="1" presetClass="entr" presetSubtype="0" fill="hold" nodeType="clickEffect">
-                                  <p:stCondLst>
-                                    <p:cond delay="0"/>
-                                  </p:stCondLst>
-                                  <p:childTnLst>
-                                    <p:set>
-                                      <p:cBhvr>
-                                        <p:cTn id="6" dur="1" fill="hold">
-                                          <p:stCondLst>
-                                            <p:cond delay="0"/>
-                                          </p:stCondLst>
-                                        </p:cTn>
-                                        <p:tgtEl>
-                                          <p:spTgt spid="24"/>
-                                        </p:tgtEl>
-                                        <p:attrNameLst>
-                                          <p:attrName>style.visibility</p:attrName>
-                                        </p:attrNameLst>
-                                      </p:cBhvr>
-                                      <p:to>
-                                        <p:strVal val="visible"/>
-                                      </p:to>
-                                    </p:set>
-                                  </p:childTnLst>
-                                </p:cTn>
-                              </p:par>
-                            </p:childTnLst>
-                          </p:cTn>
-                        </p:par>
-                      </p:childTnLst>
-                    </p:cTn>
-                  </p:par>
-                  <p:par>
-                    <p:cTn id="7" fill="hold">
-                      <p:stCondLst>
-                        <p:cond delay="indefinite"/>
-                      </p:stCondLst>
-                      <p:childTnLst>
-                        <p:par>
-                          <p:cTn id="8" fill="hold">
-                            <p:stCondLst>
-                              <p:cond delay="0"/>
-                            </p:stCondLst>
-                            <p:childTnLst>
-                              <p:par>
-                                <p:cTn id="9" presetID="1" presetClass="entr" presetSubtype="0" fill="hold" nodeType="clickEffect">
-                                  <p:stCondLst>
-                                    <p:cond delay="0"/>
-                                  </p:stCondLst>
-                                  <p:childTnLst>
-                                    <p:set>
-                                      <p:cBhvr>
-                                        <p:cTn id="10" dur="1" fill="hold">
-                                          <p:stCondLst>
-                                            <p:cond delay="0"/>
-                                          </p:stCondLst>
-                                        </p:cTn>
-                                        <p:tgtEl>
-                                          <p:spTgt spid="25"/>
-                                        </p:tgtEl>
-                                        <p:attrNameLst>
-                                          <p:attrName>style.visibility</p:attrName>
-                                        </p:attrNameLst>
-                                      </p:cBhvr>
-                                      <p:to>
-                                        <p:strVal val="visible"/>
-                                      </p:to>
-                                    </p:set>
-                                  </p:childTnLst>
-                                </p:cTn>
-                              </p:par>
-                            </p:childTnLst>
-                          </p:cTn>
-                        </p:par>
-                      </p:childTnLst>
-                    </p:cTn>
-                  </p:par>
-                </p:childTnLst>
-              </p:cTn>
-              <p:prevCondLst>
-                <p:cond evt="onPrev" delay="0">
-                  <p:tgtEl>
-                    <p:sldTgt/>
-                  </p:tgtEl>
-                </p:cond>
-              </p:prevCondLst>
-              <p:nextCondLst>
-                <p:cond evt="onNext" delay="0">
-                  <p:tgtEl>
-                    <p:sldTgt/>
-                  </p:tgtEl>
-                </p:cond>
-              </p:nextCondLst>
-            </p:seq>
-          </p:childTnLst>
-        </p:cTn>
-      </p:par>
-    </p:tnLst>
-  </p:timing>
-</p:sld>
-</file>
-
-<file path=ppt/slides/slide4.xml><?xml version="1.0" encoding="utf-8"?>
 <p:sld xmlns:a="http://schemas.openxmlformats.org/drawingml/2006/main" xmlns:r="http://schemas.openxmlformats.org/officeDocument/2006/relationships" xmlns:p="http://schemas.openxmlformats.org/presentationml/2006/main">
   <p:cSld>
     <p:spTree>
@@ -22669,6 +22238,616 @@
 </p:sld>
 </file>
 
+<file path=ppt/slides/slide4.xml><?xml version="1.0" encoding="utf-8"?>
+<p:sld xmlns:a="http://schemas.openxmlformats.org/drawingml/2006/main" xmlns:r="http://schemas.openxmlformats.org/officeDocument/2006/relationships" xmlns:p="http://schemas.openxmlformats.org/presentationml/2006/main">
+  <p:cSld>
+    <p:spTree>
+      <p:nvGrpSpPr>
+        <p:cNvPr id="1" name=""/>
+        <p:cNvGrpSpPr/>
+        <p:nvPr/>
+      </p:nvGrpSpPr>
+      <p:grpSpPr>
+        <a:xfrm>
+          <a:off x="0" y="0"/>
+          <a:ext cx="0" cy="0"/>
+          <a:chOff x="0" y="0"/>
+          <a:chExt cx="0" cy="0"/>
+        </a:xfrm>
+      </p:grpSpPr>
+      <p:pic>
+        <p:nvPicPr>
+          <p:cNvPr id="9" name="Content Placeholder 8">
+            <a:extLst>
+              <a:ext uri="{FF2B5EF4-FFF2-40B4-BE49-F238E27FC236}">
+                <a16:creationId xmlns:a16="http://schemas.microsoft.com/office/drawing/2014/main" id="{FA558190-E923-40AD-B51C-321D19F64C3B}"/>
+              </a:ext>
+            </a:extLst>
+          </p:cNvPr>
+          <p:cNvPicPr>
+            <a:picLocks noGrp="1" noChangeAspect="1"/>
+          </p:cNvPicPr>
+          <p:nvPr>
+            <p:ph idx="1"/>
+          </p:nvPr>
+        </p:nvPicPr>
+        <p:blipFill rotWithShape="1">
+          <a:blip r:embed="rId2">
+            <a:extLst>
+              <a:ext uri="{28A0092B-C50C-407E-A947-70E740481C1C}">
+                <a14:useLocalDpi xmlns:a14="http://schemas.microsoft.com/office/drawing/2010/main" val="0"/>
+              </a:ext>
+            </a:extLst>
+          </a:blip>
+          <a:srcRect t="8579" r="8614" b="6152"/>
+          <a:stretch/>
+        </p:blipFill>
+        <p:spPr>
+          <a:xfrm>
+            <a:off x="347257" y="1251031"/>
+            <a:ext cx="8308768" cy="5398049"/>
+          </a:xfrm>
+        </p:spPr>
+      </p:pic>
+      <p:sp>
+        <p:nvSpPr>
+          <p:cNvPr id="2" name="Title 1">
+            <a:extLst>
+              <a:ext uri="{FF2B5EF4-FFF2-40B4-BE49-F238E27FC236}">
+                <a16:creationId xmlns:a16="http://schemas.microsoft.com/office/drawing/2014/main" id="{FE56424F-548B-4D30-A99A-680338B5696C}"/>
+              </a:ext>
+            </a:extLst>
+          </p:cNvPr>
+          <p:cNvSpPr>
+            <a:spLocks noGrp="1"/>
+          </p:cNvSpPr>
+          <p:nvPr>
+            <p:ph type="title"/>
+          </p:nvPr>
+        </p:nvSpPr>
+        <p:spPr>
+          <a:xfrm>
+            <a:off x="684004" y="113991"/>
+            <a:ext cx="9720072" cy="1499616"/>
+          </a:xfrm>
+        </p:spPr>
+        <p:txBody>
+          <a:bodyPr/>
+          <a:lstStyle/>
+          <a:p>
+            <a:r>
+              <a:rPr lang="en-US" dirty="0"/>
+              <a:t>Electoral vote value (Traditional)</a:t>
+            </a:r>
+          </a:p>
+        </p:txBody>
+      </p:sp>
+      <p:sp>
+        <p:nvSpPr>
+          <p:cNvPr id="15" name="TextBox 14">
+            <a:extLst>
+              <a:ext uri="{FF2B5EF4-FFF2-40B4-BE49-F238E27FC236}">
+                <a16:creationId xmlns:a16="http://schemas.microsoft.com/office/drawing/2014/main" id="{DCB5FD58-FCAD-44CD-AEAC-A5563872A48E}"/>
+              </a:ext>
+            </a:extLst>
+          </p:cNvPr>
+          <p:cNvSpPr txBox="1"/>
+          <p:nvPr/>
+        </p:nvSpPr>
+        <p:spPr>
+          <a:xfrm>
+            <a:off x="8715884" y="2513086"/>
+            <a:ext cx="649609" cy="635841"/>
+          </a:xfrm>
+          <a:prstGeom prst="rect">
+            <a:avLst/>
+          </a:prstGeom>
+          <a:noFill/>
+        </p:spPr>
+        <p:txBody>
+          <a:bodyPr wrap="square" rtlCol="0">
+            <a:spAutoFit/>
+          </a:bodyPr>
+          <a:lstStyle/>
+          <a:p>
+            <a:endParaRPr lang="en-US" dirty="0"/>
+          </a:p>
+        </p:txBody>
+      </p:sp>
+      <p:grpSp>
+        <p:nvGrpSpPr>
+          <p:cNvPr id="25" name="Group 24">
+            <a:extLst>
+              <a:ext uri="{FF2B5EF4-FFF2-40B4-BE49-F238E27FC236}">
+                <a16:creationId xmlns:a16="http://schemas.microsoft.com/office/drawing/2014/main" id="{32A4E1F7-5B20-4404-9982-E00091173886}"/>
+              </a:ext>
+            </a:extLst>
+          </p:cNvPr>
+          <p:cNvGrpSpPr/>
+          <p:nvPr/>
+        </p:nvGrpSpPr>
+        <p:grpSpPr>
+          <a:xfrm>
+            <a:off x="8622649" y="1659242"/>
+            <a:ext cx="911877" cy="3064149"/>
+            <a:chOff x="9971221" y="1659242"/>
+            <a:chExt cx="911877" cy="3064149"/>
+          </a:xfrm>
+        </p:grpSpPr>
+        <p:cxnSp>
+          <p:nvCxnSpPr>
+            <p:cNvPr id="11" name="Straight Arrow Connector 10">
+              <a:extLst>
+                <a:ext uri="{FF2B5EF4-FFF2-40B4-BE49-F238E27FC236}">
+                  <a16:creationId xmlns:a16="http://schemas.microsoft.com/office/drawing/2014/main" id="{C1FF0EEA-9591-4CC2-9183-1FD27B4DA787}"/>
+                </a:ext>
+              </a:extLst>
+            </p:cNvPr>
+            <p:cNvCxnSpPr>
+              <a:cxnSpLocks/>
+            </p:cNvCxnSpPr>
+            <p:nvPr/>
+          </p:nvCxnSpPr>
+          <p:spPr>
+            <a:xfrm>
+              <a:off x="10017838" y="1659242"/>
+              <a:ext cx="0" cy="3064149"/>
+            </a:xfrm>
+            <a:prstGeom prst="straightConnector1">
+              <a:avLst/>
+            </a:prstGeom>
+            <a:ln>
+              <a:headEnd type="triangle"/>
+              <a:tailEnd type="triangle"/>
+            </a:ln>
+          </p:spPr>
+          <p:style>
+            <a:lnRef idx="1">
+              <a:schemeClr val="dk1"/>
+            </a:lnRef>
+            <a:fillRef idx="0">
+              <a:schemeClr val="dk1"/>
+            </a:fillRef>
+            <a:effectRef idx="0">
+              <a:schemeClr val="dk1"/>
+            </a:effectRef>
+            <a:fontRef idx="minor">
+              <a:schemeClr val="tx1"/>
+            </a:fontRef>
+          </p:style>
+        </p:cxnSp>
+        <p:sp>
+          <p:nvSpPr>
+            <p:cNvPr id="18" name="TextBox 17">
+              <a:extLst>
+                <a:ext uri="{FF2B5EF4-FFF2-40B4-BE49-F238E27FC236}">
+                  <a16:creationId xmlns:a16="http://schemas.microsoft.com/office/drawing/2014/main" id="{307C8936-8F91-48A5-9491-03BB285531CF}"/>
+                </a:ext>
+              </a:extLst>
+            </p:cNvPr>
+            <p:cNvSpPr txBox="1"/>
+            <p:nvPr/>
+          </p:nvSpPr>
+          <p:spPr>
+            <a:xfrm>
+              <a:off x="9971221" y="2891593"/>
+              <a:ext cx="911877" cy="369332"/>
+            </a:xfrm>
+            <a:prstGeom prst="rect">
+              <a:avLst/>
+            </a:prstGeom>
+            <a:noFill/>
+          </p:spPr>
+          <p:txBody>
+            <a:bodyPr wrap="square">
+              <a:spAutoFit/>
+            </a:bodyPr>
+            <a:lstStyle/>
+            <a:p>
+              <a:r>
+                <a:rPr lang="en-US" dirty="0"/>
+                <a:t>527k</a:t>
+              </a:r>
+            </a:p>
+          </p:txBody>
+        </p:sp>
+      </p:grpSp>
+      <p:grpSp>
+        <p:nvGrpSpPr>
+          <p:cNvPr id="24" name="Group 23">
+            <a:extLst>
+              <a:ext uri="{FF2B5EF4-FFF2-40B4-BE49-F238E27FC236}">
+                <a16:creationId xmlns:a16="http://schemas.microsoft.com/office/drawing/2014/main" id="{429CEC37-E2F0-4E45-BBEE-35DD9F8F1B7A}"/>
+              </a:ext>
+            </a:extLst>
+          </p:cNvPr>
+          <p:cNvGrpSpPr/>
+          <p:nvPr/>
+        </p:nvGrpSpPr>
+        <p:grpSpPr>
+          <a:xfrm>
+            <a:off x="851134" y="5571194"/>
+            <a:ext cx="597994" cy="369332"/>
+            <a:chOff x="2199706" y="5571194"/>
+            <a:chExt cx="597994" cy="369332"/>
+          </a:xfrm>
+        </p:grpSpPr>
+        <p:sp>
+          <p:nvSpPr>
+            <p:cNvPr id="17" name="TextBox 16">
+              <a:extLst>
+                <a:ext uri="{FF2B5EF4-FFF2-40B4-BE49-F238E27FC236}">
+                  <a16:creationId xmlns:a16="http://schemas.microsoft.com/office/drawing/2014/main" id="{8046B293-4B16-4C1E-BBCC-D428D75E0212}"/>
+                </a:ext>
+              </a:extLst>
+            </p:cNvPr>
+            <p:cNvSpPr txBox="1"/>
+            <p:nvPr/>
+          </p:nvSpPr>
+          <p:spPr>
+            <a:xfrm>
+              <a:off x="2199706" y="5571194"/>
+              <a:ext cx="597994" cy="369332"/>
+            </a:xfrm>
+            <a:prstGeom prst="rect">
+              <a:avLst/>
+            </a:prstGeom>
+            <a:noFill/>
+          </p:spPr>
+          <p:txBody>
+            <a:bodyPr wrap="square">
+              <a:spAutoFit/>
+            </a:bodyPr>
+            <a:lstStyle/>
+            <a:p>
+              <a:r>
+                <a:rPr lang="en-US" dirty="0"/>
+                <a:t>27k</a:t>
+              </a:r>
+            </a:p>
+          </p:txBody>
+        </p:sp>
+        <p:cxnSp>
+          <p:nvCxnSpPr>
+            <p:cNvPr id="21" name="Straight Arrow Connector 20">
+              <a:extLst>
+                <a:ext uri="{FF2B5EF4-FFF2-40B4-BE49-F238E27FC236}">
+                  <a16:creationId xmlns:a16="http://schemas.microsoft.com/office/drawing/2014/main" id="{7F204158-C8BA-440E-B573-E59A64921B76}"/>
+                </a:ext>
+              </a:extLst>
+            </p:cNvPr>
+            <p:cNvCxnSpPr>
+              <a:cxnSpLocks/>
+            </p:cNvCxnSpPr>
+            <p:nvPr/>
+          </p:nvCxnSpPr>
+          <p:spPr>
+            <a:xfrm>
+              <a:off x="2691536" y="5619624"/>
+              <a:ext cx="0" cy="272472"/>
+            </a:xfrm>
+            <a:prstGeom prst="straightConnector1">
+              <a:avLst/>
+            </a:prstGeom>
+            <a:ln>
+              <a:headEnd type="triangle"/>
+              <a:tailEnd type="triangle"/>
+            </a:ln>
+          </p:spPr>
+          <p:style>
+            <a:lnRef idx="1">
+              <a:schemeClr val="dk1"/>
+            </a:lnRef>
+            <a:fillRef idx="0">
+              <a:schemeClr val="dk1"/>
+            </a:fillRef>
+            <a:effectRef idx="0">
+              <a:schemeClr val="dk1"/>
+            </a:effectRef>
+            <a:fontRef idx="minor">
+              <a:schemeClr val="tx1"/>
+            </a:fontRef>
+          </p:style>
+        </p:cxnSp>
+      </p:grpSp>
+      <p:pic>
+        <p:nvPicPr>
+          <p:cNvPr id="4" name="Picture 3">
+            <a:extLst>
+              <a:ext uri="{FF2B5EF4-FFF2-40B4-BE49-F238E27FC236}">
+                <a16:creationId xmlns:a16="http://schemas.microsoft.com/office/drawing/2014/main" id="{D07939D6-BC7F-49F2-B050-8DB84841C9A9}"/>
+              </a:ext>
+            </a:extLst>
+          </p:cNvPr>
+          <p:cNvPicPr>
+            <a:picLocks noChangeAspect="1"/>
+          </p:cNvPicPr>
+          <p:nvPr/>
+        </p:nvPicPr>
+        <p:blipFill rotWithShape="1">
+          <a:blip r:embed="rId3">
+            <a:extLst>
+              <a:ext uri="{28A0092B-C50C-407E-A947-70E740481C1C}">
+                <a14:useLocalDpi xmlns:a14="http://schemas.microsoft.com/office/drawing/2010/main" val="0"/>
+              </a:ext>
+            </a:extLst>
+          </a:blip>
+          <a:srcRect l="1031" t="15890" r="295" b="11202"/>
+          <a:stretch/>
+        </p:blipFill>
+        <p:spPr>
+          <a:xfrm>
+            <a:off x="482073" y="1077253"/>
+            <a:ext cx="10643798" cy="5475974"/>
+          </a:xfrm>
+          <a:prstGeom prst="rect">
+            <a:avLst/>
+          </a:prstGeom>
+        </p:spPr>
+      </p:pic>
+      <p:sp>
+        <p:nvSpPr>
+          <p:cNvPr id="26" name="TextBox 25">
+            <a:extLst>
+              <a:ext uri="{FF2B5EF4-FFF2-40B4-BE49-F238E27FC236}">
+                <a16:creationId xmlns:a16="http://schemas.microsoft.com/office/drawing/2014/main" id="{DD04B47C-7C1E-4211-9352-076DDD070D2F}"/>
+              </a:ext>
+            </a:extLst>
+          </p:cNvPr>
+          <p:cNvSpPr txBox="1"/>
+          <p:nvPr/>
+        </p:nvSpPr>
+        <p:spPr>
+          <a:xfrm flipH="1">
+            <a:off x="9179167" y="2107290"/>
+            <a:ext cx="2821793" cy="2893100"/>
+          </a:xfrm>
+          <a:prstGeom prst="rect">
+            <a:avLst/>
+          </a:prstGeom>
+          <a:noFill/>
+        </p:spPr>
+        <p:txBody>
+          <a:bodyPr wrap="square" rtlCol="0">
+            <a:spAutoFit/>
+          </a:bodyPr>
+          <a:lstStyle/>
+          <a:p>
+            <a:r>
+              <a:rPr lang="en-US" sz="2000" b="1" dirty="0"/>
+              <a:t>Current Electoral College</a:t>
+            </a:r>
+          </a:p>
+          <a:p>
+            <a:pPr marL="285750" indent="-285750">
+              <a:buFont typeface="Arial" panose="020B0604020202020204" pitchFamily="34" charset="0"/>
+              <a:buChar char="•"/>
+            </a:pPr>
+            <a:r>
+              <a:rPr lang="en-US" dirty="0"/>
+              <a:t>Electors  decided based on number of senators (2) </a:t>
+            </a:r>
+          </a:p>
+          <a:p>
+            <a:pPr marL="285750" indent="-285750">
+              <a:buFont typeface="Arial" panose="020B0604020202020204" pitchFamily="34" charset="0"/>
+              <a:buChar char="•"/>
+            </a:pPr>
+            <a:r>
+              <a:rPr lang="en-US" dirty="0"/>
+              <a:t>Number of representatives: based on relative population</a:t>
+            </a:r>
+            <a:r>
+              <a:rPr lang="en-US" b="0" i="0" dirty="0">
+                <a:solidFill>
+                  <a:srgbClr val="000000"/>
+                </a:solidFill>
+                <a:effectLst/>
+                <a:latin typeface="Lora"/>
+              </a:rPr>
+              <a:t> (minimum of 1) currently </a:t>
+            </a:r>
+            <a:r>
+              <a:rPr lang="en-US" b="1" i="0" dirty="0">
+                <a:solidFill>
+                  <a:srgbClr val="000000"/>
+                </a:solidFill>
+                <a:effectLst/>
+                <a:latin typeface="Lora"/>
+              </a:rPr>
+              <a:t>capped at 535</a:t>
+            </a:r>
+          </a:p>
+          <a:p>
+            <a:pPr marL="285750" indent="-285750">
+              <a:buFont typeface="Arial" panose="020B0604020202020204" pitchFamily="34" charset="0"/>
+              <a:buChar char="•"/>
+            </a:pPr>
+            <a:r>
+              <a:rPr lang="en-US" dirty="0"/>
+              <a:t>Each state has a minimum of 3 electors</a:t>
+            </a:r>
+          </a:p>
+        </p:txBody>
+      </p:sp>
+    </p:spTree>
+    <p:extLst>
+      <p:ext uri="{BB962C8B-B14F-4D97-AF65-F5344CB8AC3E}">
+        <p14:creationId xmlns:p14="http://schemas.microsoft.com/office/powerpoint/2010/main" val="2235912950"/>
+      </p:ext>
+    </p:extLst>
+  </p:cSld>
+  <p:clrMapOvr>
+    <a:masterClrMapping/>
+  </p:clrMapOvr>
+  <p:timing>
+    <p:tnLst>
+      <p:par>
+        <p:cTn id="1" dur="indefinite" restart="never" nodeType="tmRoot">
+          <p:childTnLst>
+            <p:seq concurrent="1" nextAc="seek">
+              <p:cTn id="2" dur="indefinite" nodeType="mainSeq">
+                <p:childTnLst>
+                  <p:par>
+                    <p:cTn id="3" fill="hold">
+                      <p:stCondLst>
+                        <p:cond delay="indefinite"/>
+                      </p:stCondLst>
+                      <p:childTnLst>
+                        <p:par>
+                          <p:cTn id="4" fill="hold">
+                            <p:stCondLst>
+                              <p:cond delay="0"/>
+                            </p:stCondLst>
+                            <p:childTnLst>
+                              <p:par>
+                                <p:cTn id="5" presetID="1" presetClass="entr" presetSubtype="0" fill="hold" nodeType="clickEffect">
+                                  <p:stCondLst>
+                                    <p:cond delay="0"/>
+                                  </p:stCondLst>
+                                  <p:childTnLst>
+                                    <p:set>
+                                      <p:cBhvr>
+                                        <p:cTn id="6" dur="1" fill="hold">
+                                          <p:stCondLst>
+                                            <p:cond delay="0"/>
+                                          </p:stCondLst>
+                                        </p:cTn>
+                                        <p:tgtEl>
+                                          <p:spTgt spid="24"/>
+                                        </p:tgtEl>
+                                        <p:attrNameLst>
+                                          <p:attrName>style.visibility</p:attrName>
+                                        </p:attrNameLst>
+                                      </p:cBhvr>
+                                      <p:to>
+                                        <p:strVal val="visible"/>
+                                      </p:to>
+                                    </p:set>
+                                  </p:childTnLst>
+                                </p:cTn>
+                              </p:par>
+                            </p:childTnLst>
+                          </p:cTn>
+                        </p:par>
+                      </p:childTnLst>
+                    </p:cTn>
+                  </p:par>
+                  <p:par>
+                    <p:cTn id="7" fill="hold">
+                      <p:stCondLst>
+                        <p:cond delay="indefinite"/>
+                      </p:stCondLst>
+                      <p:childTnLst>
+                        <p:par>
+                          <p:cTn id="8" fill="hold">
+                            <p:stCondLst>
+                              <p:cond delay="0"/>
+                            </p:stCondLst>
+                            <p:childTnLst>
+                              <p:par>
+                                <p:cTn id="9" presetID="1" presetClass="entr" presetSubtype="0" fill="hold" nodeType="clickEffect">
+                                  <p:stCondLst>
+                                    <p:cond delay="0"/>
+                                  </p:stCondLst>
+                                  <p:childTnLst>
+                                    <p:set>
+                                      <p:cBhvr>
+                                        <p:cTn id="10" dur="1" fill="hold">
+                                          <p:stCondLst>
+                                            <p:cond delay="0"/>
+                                          </p:stCondLst>
+                                        </p:cTn>
+                                        <p:tgtEl>
+                                          <p:spTgt spid="25"/>
+                                        </p:tgtEl>
+                                        <p:attrNameLst>
+                                          <p:attrName>style.visibility</p:attrName>
+                                        </p:attrNameLst>
+                                      </p:cBhvr>
+                                      <p:to>
+                                        <p:strVal val="visible"/>
+                                      </p:to>
+                                    </p:set>
+                                  </p:childTnLst>
+                                </p:cTn>
+                              </p:par>
+                            </p:childTnLst>
+                          </p:cTn>
+                        </p:par>
+                      </p:childTnLst>
+                    </p:cTn>
+                  </p:par>
+                  <p:par>
+                    <p:cTn id="11" fill="hold">
+                      <p:stCondLst>
+                        <p:cond delay="indefinite"/>
+                      </p:stCondLst>
+                      <p:childTnLst>
+                        <p:par>
+                          <p:cTn id="12" fill="hold">
+                            <p:stCondLst>
+                              <p:cond delay="0"/>
+                            </p:stCondLst>
+                            <p:childTnLst>
+                              <p:par>
+                                <p:cTn id="13" presetID="1" presetClass="entr" presetSubtype="0" fill="hold" nodeType="clickEffect">
+                                  <p:stCondLst>
+                                    <p:cond delay="0"/>
+                                  </p:stCondLst>
+                                  <p:childTnLst>
+                                    <p:set>
+                                      <p:cBhvr>
+                                        <p:cTn id="14" dur="1" fill="hold">
+                                          <p:stCondLst>
+                                            <p:cond delay="0"/>
+                                          </p:stCondLst>
+                                        </p:cTn>
+                                        <p:tgtEl>
+                                          <p:spTgt spid="4"/>
+                                        </p:tgtEl>
+                                        <p:attrNameLst>
+                                          <p:attrName>style.visibility</p:attrName>
+                                        </p:attrNameLst>
+                                      </p:cBhvr>
+                                      <p:to>
+                                        <p:strVal val="visible"/>
+                                      </p:to>
+                                    </p:set>
+                                  </p:childTnLst>
+                                </p:cTn>
+                              </p:par>
+                            </p:childTnLst>
+                          </p:cTn>
+                        </p:par>
+                      </p:childTnLst>
+                    </p:cTn>
+                  </p:par>
+                </p:childTnLst>
+              </p:cTn>
+              <p:prevCondLst>
+                <p:cond evt="onPrev" delay="0">
+                  <p:tgtEl>
+                    <p:sldTgt/>
+                  </p:tgtEl>
+                </p:cond>
+              </p:prevCondLst>
+              <p:nextCondLst>
+                <p:cond evt="onNext" delay="0">
+                  <p:tgtEl>
+                    <p:sldTgt/>
+                  </p:tgtEl>
+                </p:cond>
+              </p:nextCondLst>
+            </p:seq>
+          </p:childTnLst>
+        </p:cTn>
+      </p:par>
+    </p:tnLst>
+  </p:timing>
+</p:sld>
+</file>
+
 <file path=ppt/slides/slide5.xml><?xml version="1.0" encoding="utf-8"?>
 <p:sld xmlns:a="http://schemas.openxmlformats.org/drawingml/2006/main" xmlns:r="http://schemas.openxmlformats.org/officeDocument/2006/relationships" xmlns:p="http://schemas.openxmlformats.org/presentationml/2006/main">
   <p:cSld>
@@ -22707,6 +22886,13 @@
           <a:bodyPr/>
           <a:lstStyle/>
           <a:p>
+            <a:r>
+              <a:rPr lang="en-US" dirty="0"/>
+              <a:t>Alternative #1:</a:t>
+            </a:r>
+            <a:br>
+              <a:rPr lang="en-US" dirty="0"/>
+            </a:br>
             <a:r>
               <a:rPr lang="en-US" dirty="0"/>
               <a:t>Popular vote with electoral college</a:t>
@@ -23158,7 +23344,306 @@
           <a:p>
             <a:r>
               <a:rPr lang="en-US" dirty="0"/>
-              <a:t>Another solution</a:t>
+              <a:t>Alternative #2: </a:t>
+            </a:r>
+            <a:br>
+              <a:rPr lang="en-US" dirty="0"/>
+            </a:br>
+            <a:r>
+              <a:rPr lang="en-US" dirty="0"/>
+              <a:t>Increase Congressional representation</a:t>
+            </a:r>
+          </a:p>
+        </p:txBody>
+      </p:sp>
+      <p:pic>
+        <p:nvPicPr>
+          <p:cNvPr id="7" name="Picture 6">
+            <a:extLst>
+              <a:ext uri="{FF2B5EF4-FFF2-40B4-BE49-F238E27FC236}">
+                <a16:creationId xmlns:a16="http://schemas.microsoft.com/office/drawing/2014/main" id="{7F66C841-5424-4DBA-95CA-2FF774B1F932}"/>
+              </a:ext>
+            </a:extLst>
+          </p:cNvPr>
+          <p:cNvPicPr>
+            <a:picLocks noChangeAspect="1"/>
+          </p:cNvPicPr>
+          <p:nvPr/>
+        </p:nvPicPr>
+        <p:blipFill rotWithShape="1">
+          <a:blip r:embed="rId2">
+            <a:extLst>
+              <a:ext uri="{28A0092B-C50C-407E-A947-70E740481C1C}">
+                <a14:useLocalDpi xmlns:a14="http://schemas.microsoft.com/office/drawing/2010/main" val="0"/>
+              </a:ext>
+            </a:extLst>
+          </a:blip>
+          <a:srcRect l="-1" t="15929" r="-275" b="11046"/>
+          <a:stretch/>
+        </p:blipFill>
+        <p:spPr>
+          <a:xfrm>
+            <a:off x="459398" y="1386903"/>
+            <a:ext cx="9779423" cy="4958862"/>
+          </a:xfrm>
+          <a:prstGeom prst="rect">
+            <a:avLst/>
+          </a:prstGeom>
+        </p:spPr>
+      </p:pic>
+      <p:sp>
+        <p:nvSpPr>
+          <p:cNvPr id="10" name="TextBox 9">
+            <a:extLst>
+              <a:ext uri="{FF2B5EF4-FFF2-40B4-BE49-F238E27FC236}">
+                <a16:creationId xmlns:a16="http://schemas.microsoft.com/office/drawing/2014/main" id="{ECD7767A-FA97-4797-9746-398499E07DDA}"/>
+              </a:ext>
+            </a:extLst>
+          </p:cNvPr>
+          <p:cNvSpPr txBox="1"/>
+          <p:nvPr/>
+        </p:nvSpPr>
+        <p:spPr>
+          <a:xfrm flipH="1">
+            <a:off x="9014306" y="2854996"/>
+            <a:ext cx="2960273" cy="2616101"/>
+          </a:xfrm>
+          <a:prstGeom prst="rect">
+            <a:avLst/>
+          </a:prstGeom>
+          <a:noFill/>
+        </p:spPr>
+        <p:txBody>
+          <a:bodyPr wrap="square" rtlCol="0">
+            <a:spAutoFit/>
+          </a:bodyPr>
+          <a:lstStyle/>
+          <a:p>
+            <a:r>
+              <a:rPr lang="en-US" sz="2000" b="1" dirty="0"/>
+              <a:t>New Electoral College</a:t>
+            </a:r>
+          </a:p>
+          <a:p>
+            <a:pPr marL="285750" indent="-285750">
+              <a:buFont typeface="Arial" panose="020B0604020202020204" pitchFamily="34" charset="0"/>
+              <a:buChar char="•"/>
+            </a:pPr>
+            <a:r>
+              <a:rPr lang="en-US" dirty="0"/>
+              <a:t>Electors  decided based on number of senators (2) </a:t>
+            </a:r>
+          </a:p>
+          <a:p>
+            <a:pPr marL="285750" indent="-285750">
+              <a:buFont typeface="Arial" panose="020B0604020202020204" pitchFamily="34" charset="0"/>
+              <a:buChar char="•"/>
+            </a:pPr>
+            <a:r>
+              <a:rPr lang="en-US" dirty="0"/>
+              <a:t>Number of representatives: based on relative population</a:t>
+            </a:r>
+            <a:r>
+              <a:rPr lang="en-US" b="0" i="0" dirty="0">
+                <a:solidFill>
+                  <a:srgbClr val="000000"/>
+                </a:solidFill>
+                <a:effectLst/>
+                <a:latin typeface="Lora"/>
+              </a:rPr>
+              <a:t> (minimum of 1) </a:t>
+            </a:r>
+            <a:r>
+              <a:rPr lang="en-US" b="1" i="0" dirty="0">
+                <a:solidFill>
+                  <a:srgbClr val="000000"/>
+                </a:solidFill>
+                <a:effectLst/>
+                <a:latin typeface="Lora"/>
+              </a:rPr>
+              <a:t>capped at 2712</a:t>
+            </a:r>
+          </a:p>
+          <a:p>
+            <a:pPr marL="285750" indent="-285750">
+              <a:buFont typeface="Arial" panose="020B0604020202020204" pitchFamily="34" charset="0"/>
+              <a:buChar char="•"/>
+            </a:pPr>
+            <a:r>
+              <a:rPr lang="en-US" dirty="0"/>
+              <a:t>Each state has a minimum of 14 electors</a:t>
+            </a:r>
+          </a:p>
+        </p:txBody>
+      </p:sp>
+      <p:sp>
+        <p:nvSpPr>
+          <p:cNvPr id="11" name="TextBox 10">
+            <a:extLst>
+              <a:ext uri="{FF2B5EF4-FFF2-40B4-BE49-F238E27FC236}">
+                <a16:creationId xmlns:a16="http://schemas.microsoft.com/office/drawing/2014/main" id="{6D8B4AC3-5D99-428D-AA77-81E6FDD6E9CA}"/>
+              </a:ext>
+            </a:extLst>
+          </p:cNvPr>
+          <p:cNvSpPr txBox="1"/>
+          <p:nvPr/>
+        </p:nvSpPr>
+        <p:spPr>
+          <a:xfrm>
+            <a:off x="2514601" y="6345765"/>
+            <a:ext cx="6056574" cy="523220"/>
+          </a:xfrm>
+          <a:prstGeom prst="rect">
+            <a:avLst/>
+          </a:prstGeom>
+          <a:noFill/>
+        </p:spPr>
+        <p:txBody>
+          <a:bodyPr wrap="square" rtlCol="0">
+            <a:spAutoFit/>
+          </a:bodyPr>
+          <a:lstStyle/>
+          <a:p>
+            <a:pPr algn="ctr"/>
+            <a:r>
+              <a:rPr lang="en-US" sz="2800" dirty="0"/>
+              <a:t>No outcomes changed</a:t>
+            </a:r>
+          </a:p>
+        </p:txBody>
+      </p:sp>
+    </p:spTree>
+    <p:extLst>
+      <p:ext uri="{BB962C8B-B14F-4D97-AF65-F5344CB8AC3E}">
+        <p14:creationId xmlns:p14="http://schemas.microsoft.com/office/powerpoint/2010/main" val="964170309"/>
+      </p:ext>
+    </p:extLst>
+  </p:cSld>
+  <p:clrMapOvr>
+    <a:masterClrMapping/>
+  </p:clrMapOvr>
+  <p:timing>
+    <p:tnLst>
+      <p:par>
+        <p:cTn id="1" dur="indefinite" restart="never" nodeType="tmRoot">
+          <p:childTnLst>
+            <p:seq concurrent="1" nextAc="seek">
+              <p:cTn id="2" dur="indefinite" nodeType="mainSeq">
+                <p:childTnLst>
+                  <p:par>
+                    <p:cTn id="3" fill="hold">
+                      <p:stCondLst>
+                        <p:cond delay="indefinite"/>
+                      </p:stCondLst>
+                      <p:childTnLst>
+                        <p:par>
+                          <p:cTn id="4" fill="hold">
+                            <p:stCondLst>
+                              <p:cond delay="0"/>
+                            </p:stCondLst>
+                            <p:childTnLst>
+                              <p:par>
+                                <p:cTn id="5" presetID="1" presetClass="entr" presetSubtype="0" fill="hold" grpId="0" nodeType="clickEffect">
+                                  <p:stCondLst>
+                                    <p:cond delay="0"/>
+                                  </p:stCondLst>
+                                  <p:childTnLst>
+                                    <p:set>
+                                      <p:cBhvr>
+                                        <p:cTn id="6" dur="1" fill="hold">
+                                          <p:stCondLst>
+                                            <p:cond delay="0"/>
+                                          </p:stCondLst>
+                                        </p:cTn>
+                                        <p:tgtEl>
+                                          <p:spTgt spid="11"/>
+                                        </p:tgtEl>
+                                        <p:attrNameLst>
+                                          <p:attrName>style.visibility</p:attrName>
+                                        </p:attrNameLst>
+                                      </p:cBhvr>
+                                      <p:to>
+                                        <p:strVal val="visible"/>
+                                      </p:to>
+                                    </p:set>
+                                  </p:childTnLst>
+                                </p:cTn>
+                              </p:par>
+                            </p:childTnLst>
+                          </p:cTn>
+                        </p:par>
+                      </p:childTnLst>
+                    </p:cTn>
+                  </p:par>
+                </p:childTnLst>
+              </p:cTn>
+              <p:prevCondLst>
+                <p:cond evt="onPrev" delay="0">
+                  <p:tgtEl>
+                    <p:sldTgt/>
+                  </p:tgtEl>
+                </p:cond>
+              </p:prevCondLst>
+              <p:nextCondLst>
+                <p:cond evt="onNext" delay="0">
+                  <p:tgtEl>
+                    <p:sldTgt/>
+                  </p:tgtEl>
+                </p:cond>
+              </p:nextCondLst>
+            </p:seq>
+          </p:childTnLst>
+        </p:cTn>
+      </p:par>
+    </p:tnLst>
+    <p:bldLst>
+      <p:bldP spid="11" grpId="0"/>
+    </p:bldLst>
+  </p:timing>
+</p:sld>
+</file>
+
+<file path=ppt/slides/slide7.xml><?xml version="1.0" encoding="utf-8"?>
+<p:sld xmlns:a="http://schemas.openxmlformats.org/drawingml/2006/main" xmlns:r="http://schemas.openxmlformats.org/officeDocument/2006/relationships" xmlns:p="http://schemas.openxmlformats.org/presentationml/2006/main">
+  <p:cSld>
+    <p:spTree>
+      <p:nvGrpSpPr>
+        <p:cNvPr id="1" name=""/>
+        <p:cNvGrpSpPr/>
+        <p:nvPr/>
+      </p:nvGrpSpPr>
+      <p:grpSpPr>
+        <a:xfrm>
+          <a:off x="0" y="0"/>
+          <a:ext cx="0" cy="0"/>
+          <a:chOff x="0" y="0"/>
+          <a:chExt cx="0" cy="0"/>
+        </a:xfrm>
+      </p:grpSpPr>
+      <p:sp>
+        <p:nvSpPr>
+          <p:cNvPr id="2" name="Title 1">
+            <a:extLst>
+              <a:ext uri="{FF2B5EF4-FFF2-40B4-BE49-F238E27FC236}">
+                <a16:creationId xmlns:a16="http://schemas.microsoft.com/office/drawing/2014/main" id="{97214664-AB29-4878-8AE8-198AA72B84A5}"/>
+              </a:ext>
+            </a:extLst>
+          </p:cNvPr>
+          <p:cNvSpPr>
+            <a:spLocks noGrp="1"/>
+          </p:cNvSpPr>
+          <p:nvPr>
+            <p:ph type="title"/>
+          </p:nvPr>
+        </p:nvSpPr>
+        <p:spPr/>
+        <p:txBody>
+          <a:bodyPr/>
+          <a:lstStyle/>
+          <a:p>
+            <a:r>
+              <a:rPr lang="en-US" dirty="0"/>
+              <a:t>Conclusions</a:t>
             </a:r>
           </a:p>
         </p:txBody>
@@ -23168,7 +23653,7 @@
           <p:cNvPr id="3" name="Content Placeholder 2">
             <a:extLst>
               <a:ext uri="{FF2B5EF4-FFF2-40B4-BE49-F238E27FC236}">
-                <a16:creationId xmlns:a16="http://schemas.microsoft.com/office/drawing/2014/main" id="{2ED1ED10-EF74-4613-ACAE-48AF832D99CD}"/>
+                <a16:creationId xmlns:a16="http://schemas.microsoft.com/office/drawing/2014/main" id="{4CE75EA6-341C-4CE1-A7D9-B8528FD0B4E0}"/>
               </a:ext>
             </a:extLst>
           </p:cNvPr>
@@ -23179,19 +23664,71 @@
             <p:ph idx="1"/>
           </p:nvPr>
         </p:nvSpPr>
-        <p:spPr/>
+        <p:spPr>
+          <a:xfrm>
+            <a:off x="1024128" y="1559169"/>
+            <a:ext cx="9720073" cy="4750191"/>
+          </a:xfrm>
+        </p:spPr>
         <p:txBody>
           <a:bodyPr/>
           <a:lstStyle/>
           <a:p>
-            <a:endParaRPr lang="en-US"/>
+            <a:pPr marL="457200" indent="-228600">
+              <a:buFont typeface="Wingdings" panose="05000000000000000000" pitchFamily="2" charset="2"/>
+              <a:buChar char="§"/>
+            </a:pPr>
+            <a:r>
+              <a:rPr lang="en-US" sz="2800" dirty="0"/>
+              <a:t>There would have to be </a:t>
+            </a:r>
+            <a:r>
+              <a:rPr lang="en-US" sz="2800" b="1" dirty="0"/>
+              <a:t>significant changes </a:t>
+            </a:r>
+            <a:r>
+              <a:rPr lang="en-US" sz="2800" dirty="0"/>
+              <a:t>to the </a:t>
+            </a:r>
+            <a:r>
+              <a:rPr lang="en-US" sz="2800" b="1" dirty="0"/>
+              <a:t>allocation</a:t>
+            </a:r>
+            <a:r>
+              <a:rPr lang="en-US" sz="2800" dirty="0"/>
+              <a:t> to impact the outcome and maintain the </a:t>
+            </a:r>
+            <a:r>
+              <a:rPr lang="en-US" sz="2800" b="1" dirty="0"/>
+              <a:t>electoral college</a:t>
+            </a:r>
+          </a:p>
+          <a:p>
+            <a:pPr marL="457200" indent="-228600">
+              <a:buFont typeface="Wingdings" panose="05000000000000000000" pitchFamily="2" charset="2"/>
+              <a:buChar char="§"/>
+            </a:pPr>
+            <a:r>
+              <a:rPr lang="en-US" sz="3200" dirty="0"/>
+              <a:t>Alternatively, change to a straight popular vote. </a:t>
+            </a:r>
+            <a:r>
+              <a:rPr lang="en-US" sz="3200" dirty="0">
+                <a:sym typeface="Wingdings" panose="05000000000000000000" pitchFamily="2" charset="2"/>
+              </a:rPr>
+              <a:t></a:t>
+            </a:r>
+            <a:endParaRPr lang="en-US" sz="2800" dirty="0"/>
+          </a:p>
+          <a:p>
+            <a:endParaRPr lang="en-US" dirty="0"/>
           </a:p>
         </p:txBody>
       </p:sp>
     </p:spTree>
     <p:extLst>
       <p:ext uri="{BB962C8B-B14F-4D97-AF65-F5344CB8AC3E}">
-        <p14:creationId xmlns:p14="http://schemas.microsoft.com/office/powerpoint/2010/main" val="964170309"/>
+        <p14:creationId xmlns:p14="http://schemas.microsoft.com/office/powerpoint/2010/main" val="692526255"/>
       </p:ext>
     </p:extLst>
   </p:cSld>

</xml_diff>